<commit_message>
resolve knet prefix issues
</commit_message>
<xml_diff>
--- a/doc/knet.pptx
+++ b/doc/knet.pptx
@@ -262,7 +262,7 @@
           <a:p>
             <a:fld id="{5D0EEB5A-FAFB-4970-8082-181E922B6EBC}" type="datetimeFigureOut">
               <a:rPr lang="zh-CN" altLang="en-US" smtClean="0"/>
-              <a:t>2015/7/17</a:t>
+              <a:t>2015/7/21</a:t>
             </a:fld>
             <a:endParaRPr lang="zh-CN" altLang="en-US"/>
           </a:p>
@@ -432,7 +432,7 @@
           <a:p>
             <a:fld id="{5D0EEB5A-FAFB-4970-8082-181E922B6EBC}" type="datetimeFigureOut">
               <a:rPr lang="zh-CN" altLang="en-US" smtClean="0"/>
-              <a:t>2015/7/17</a:t>
+              <a:t>2015/7/21</a:t>
             </a:fld>
             <a:endParaRPr lang="zh-CN" altLang="en-US"/>
           </a:p>
@@ -612,7 +612,7 @@
           <a:p>
             <a:fld id="{5D0EEB5A-FAFB-4970-8082-181E922B6EBC}" type="datetimeFigureOut">
               <a:rPr lang="zh-CN" altLang="en-US" smtClean="0"/>
-              <a:t>2015/7/17</a:t>
+              <a:t>2015/7/21</a:t>
             </a:fld>
             <a:endParaRPr lang="zh-CN" altLang="en-US"/>
           </a:p>
@@ -782,7 +782,7 @@
           <a:p>
             <a:fld id="{5D0EEB5A-FAFB-4970-8082-181E922B6EBC}" type="datetimeFigureOut">
               <a:rPr lang="zh-CN" altLang="en-US" smtClean="0"/>
-              <a:t>2015/7/17</a:t>
+              <a:t>2015/7/21</a:t>
             </a:fld>
             <a:endParaRPr lang="zh-CN" altLang="en-US"/>
           </a:p>
@@ -1028,7 +1028,7 @@
           <a:p>
             <a:fld id="{5D0EEB5A-FAFB-4970-8082-181E922B6EBC}" type="datetimeFigureOut">
               <a:rPr lang="zh-CN" altLang="en-US" smtClean="0"/>
-              <a:t>2015/7/17</a:t>
+              <a:t>2015/7/21</a:t>
             </a:fld>
             <a:endParaRPr lang="zh-CN" altLang="en-US"/>
           </a:p>
@@ -1260,7 +1260,7 @@
           <a:p>
             <a:fld id="{5D0EEB5A-FAFB-4970-8082-181E922B6EBC}" type="datetimeFigureOut">
               <a:rPr lang="zh-CN" altLang="en-US" smtClean="0"/>
-              <a:t>2015/7/17</a:t>
+              <a:t>2015/7/21</a:t>
             </a:fld>
             <a:endParaRPr lang="zh-CN" altLang="en-US"/>
           </a:p>
@@ -1627,7 +1627,7 @@
           <a:p>
             <a:fld id="{5D0EEB5A-FAFB-4970-8082-181E922B6EBC}" type="datetimeFigureOut">
               <a:rPr lang="zh-CN" altLang="en-US" smtClean="0"/>
-              <a:t>2015/7/17</a:t>
+              <a:t>2015/7/21</a:t>
             </a:fld>
             <a:endParaRPr lang="zh-CN" altLang="en-US"/>
           </a:p>
@@ -1745,7 +1745,7 @@
           <a:p>
             <a:fld id="{5D0EEB5A-FAFB-4970-8082-181E922B6EBC}" type="datetimeFigureOut">
               <a:rPr lang="zh-CN" altLang="en-US" smtClean="0"/>
-              <a:t>2015/7/17</a:t>
+              <a:t>2015/7/21</a:t>
             </a:fld>
             <a:endParaRPr lang="zh-CN" altLang="en-US"/>
           </a:p>
@@ -1840,7 +1840,7 @@
           <a:p>
             <a:fld id="{5D0EEB5A-FAFB-4970-8082-181E922B6EBC}" type="datetimeFigureOut">
               <a:rPr lang="zh-CN" altLang="en-US" smtClean="0"/>
-              <a:t>2015/7/17</a:t>
+              <a:t>2015/7/21</a:t>
             </a:fld>
             <a:endParaRPr lang="zh-CN" altLang="en-US"/>
           </a:p>
@@ -2117,7 +2117,7 @@
           <a:p>
             <a:fld id="{5D0EEB5A-FAFB-4970-8082-181E922B6EBC}" type="datetimeFigureOut">
               <a:rPr lang="zh-CN" altLang="en-US" smtClean="0"/>
-              <a:t>2015/7/17</a:t>
+              <a:t>2015/7/21</a:t>
             </a:fld>
             <a:endParaRPr lang="zh-CN" altLang="en-US"/>
           </a:p>
@@ -2370,7 +2370,7 @@
           <a:p>
             <a:fld id="{5D0EEB5A-FAFB-4970-8082-181E922B6EBC}" type="datetimeFigureOut">
               <a:rPr lang="zh-CN" altLang="en-US" smtClean="0"/>
-              <a:t>2015/7/17</a:t>
+              <a:t>2015/7/21</a:t>
             </a:fld>
             <a:endParaRPr lang="zh-CN" altLang="en-US"/>
           </a:p>
@@ -2583,7 +2583,7 @@
           <a:p>
             <a:fld id="{5D0EEB5A-FAFB-4970-8082-181E922B6EBC}" type="datetimeFigureOut">
               <a:rPr lang="zh-CN" altLang="en-US" smtClean="0"/>
-              <a:t>2015/7/17</a:t>
+              <a:t>2015/7/21</a:t>
             </a:fld>
             <a:endParaRPr lang="zh-CN" altLang="en-US"/>
           </a:p>
@@ -3331,7 +3331,7 @@
           <a:p>
             <a:r>
               <a:rPr lang="en-US" altLang="zh-CN" dirty="0" err="1" smtClean="0"/>
-              <a:t>channel_ref_share</a:t>
+              <a:t>kchannel_ref_share</a:t>
             </a:r>
             <a:endParaRPr lang="en-US" altLang="zh-CN" dirty="0" smtClean="0"/>
           </a:p>
@@ -3346,7 +3346,7 @@
             </a:r>
             <a:r>
               <a:rPr lang="en-US" altLang="zh-CN" dirty="0" err="1" smtClean="0"/>
-              <a:t>channel_ref_t</a:t>
+              <a:t>kchannel_ref_t</a:t>
             </a:r>
             <a:endParaRPr lang="en-US" altLang="zh-CN" dirty="0" smtClean="0"/>
           </a:p>
@@ -3361,7 +3361,7 @@
             </a:r>
             <a:r>
               <a:rPr lang="en-US" altLang="zh-CN" dirty="0" err="1" smtClean="0"/>
-              <a:t>channe_ref_t</a:t>
+              <a:t>kchanne_ref_t</a:t>
             </a:r>
             <a:r>
               <a:rPr lang="en-US" altLang="zh-CN" dirty="0" smtClean="0"/>
@@ -3369,14 +3369,14 @@
             </a:r>
             <a:r>
               <a:rPr lang="en-US" altLang="zh-CN" dirty="0" err="1" smtClean="0"/>
-              <a:t>loop_t</a:t>
+              <a:t>kloop_t</a:t>
             </a:r>
             <a:endParaRPr lang="en-US" altLang="zh-CN" dirty="0" smtClean="0"/>
           </a:p>
           <a:p>
             <a:r>
               <a:rPr lang="en-US" altLang="zh-CN" dirty="0" err="1" smtClean="0"/>
-              <a:t>channel_ref_leave</a:t>
+              <a:t>kchannel_ref_leave</a:t>
             </a:r>
             <a:endParaRPr lang="en-US" altLang="zh-CN" dirty="0" smtClean="0"/>
           </a:p>
@@ -3391,7 +3391,7 @@
             </a:r>
             <a:r>
               <a:rPr lang="en-US" altLang="zh-CN" dirty="0" err="1" smtClean="0"/>
-              <a:t>channel_ref_t</a:t>
+              <a:t>kchannel_ref_t</a:t>
             </a:r>
             <a:endParaRPr lang="en-US" altLang="zh-CN" dirty="0" smtClean="0"/>
           </a:p>
@@ -3408,7 +3408,7 @@
           <a:p>
             <a:r>
               <a:rPr lang="en-US" altLang="zh-CN" dirty="0" err="1" smtClean="0"/>
-              <a:t>channel_ref_t</a:t>
+              <a:t>kchannel_ref_t</a:t>
             </a:r>
             <a:r>
               <a:rPr lang="en-US" altLang="zh-CN" dirty="0" smtClean="0"/>
@@ -3418,7 +3418,7 @@
           <a:p>
             <a:r>
               <a:rPr lang="en-US" altLang="zh-CN" dirty="0" err="1" smtClean="0"/>
-              <a:t>channel_ref_close</a:t>
+              <a:t>kchannel_ref_close</a:t>
             </a:r>
             <a:endParaRPr lang="en-US" altLang="zh-CN" dirty="0" smtClean="0"/>
           </a:p>
@@ -3438,12 +3438,8 @@
               <a:buAutoNum type="alphaLcPeriod"/>
             </a:pPr>
             <a:r>
-              <a:rPr lang="en-US" altLang="zh-CN" dirty="0" err="1"/>
-              <a:t>l</a:t>
-            </a:r>
-            <a:r>
               <a:rPr lang="en-US" altLang="zh-CN" dirty="0" err="1" smtClean="0"/>
-              <a:t>oop_t</a:t>
+              <a:t>kloop_t</a:t>
             </a:r>
             <a:r>
               <a:rPr lang="en-US" altLang="zh-CN" dirty="0" smtClean="0"/>
@@ -3554,11 +3550,7 @@
           <a:p>
             <a:r>
               <a:rPr lang="en-US" altLang="zh-CN" dirty="0" smtClean="0"/>
-              <a:t>Thread </a:t>
-            </a:r>
-            <a:r>
-              <a:rPr lang="en-US" altLang="zh-CN" dirty="0" smtClean="0"/>
-              <a:t>safety</a:t>
+              <a:t>Thread safety</a:t>
             </a:r>
           </a:p>
           <a:p>
@@ -6213,15 +6205,34 @@
           </a:p>
           <a:p>
             <a:r>
-              <a:rPr lang="en-US" altLang="zh-CN" dirty="0" smtClean="0"/>
-              <a:t>Channel &amp; channel reference</a:t>
-            </a:r>
-          </a:p>
-          <a:p>
-            <a:r>
-              <a:rPr lang="en-US" altLang="zh-CN" dirty="0" smtClean="0"/>
-              <a:t>timer</a:t>
-            </a:r>
+              <a:rPr lang="en-US" altLang="zh-CN" dirty="0"/>
+              <a:t>c</a:t>
+            </a:r>
+            <a:r>
+              <a:rPr lang="en-US" altLang="zh-CN" dirty="0" smtClean="0"/>
+              <a:t>hannel </a:t>
+            </a:r>
+            <a:r>
+              <a:rPr lang="en-US" altLang="zh-CN" dirty="0" smtClean="0"/>
+              <a:t>&amp; channel reference</a:t>
+            </a:r>
+          </a:p>
+          <a:p>
+            <a:r>
+              <a:rPr lang="en-US" altLang="zh-CN" dirty="0"/>
+              <a:t>t</a:t>
+            </a:r>
+            <a:r>
+              <a:rPr lang="en-US" altLang="zh-CN" dirty="0" smtClean="0"/>
+              <a:t>imer</a:t>
+            </a:r>
+          </a:p>
+          <a:p>
+            <a:r>
+              <a:rPr lang="en-US" altLang="zh-CN" dirty="0" smtClean="0"/>
+              <a:t>framework</a:t>
+            </a:r>
+            <a:endParaRPr lang="en-US" altLang="zh-CN" dirty="0" smtClean="0"/>
           </a:p>
           <a:p>
             <a:r>
@@ -7104,15 +7115,7 @@
                   <a:srgbClr val="FF0000"/>
                 </a:solidFill>
               </a:rPr>
-              <a:t>a</a:t>
-            </a:r>
-            <a:r>
-              <a:rPr lang="en-US" altLang="zh-CN" dirty="0" smtClean="0">
-                <a:solidFill>
-                  <a:srgbClr val="FF0000"/>
-                </a:solidFill>
-              </a:rPr>
-              <a:t>ccept/connect</a:t>
+              <a:t>accept/connect</a:t>
             </a:r>
             <a:endParaRPr lang="zh-CN" altLang="en-US" dirty="0">
               <a:solidFill>
@@ -8224,7 +8227,7 @@
           <a:p>
             <a:r>
               <a:rPr lang="en-US" altLang="zh-CN" dirty="0" err="1" smtClean="0"/>
-              <a:t>loop_t</a:t>
+              <a:t>kloop_t</a:t>
             </a:r>
             <a:endParaRPr lang="en-US" altLang="zh-CN" dirty="0" smtClean="0"/>
           </a:p>
@@ -8455,7 +8458,7 @@
             </a:r>
             <a:r>
               <a:rPr lang="en-US" altLang="zh-CN" dirty="0" err="1" smtClean="0"/>
-              <a:t>loop_t</a:t>
+              <a:t>kloop_t</a:t>
             </a:r>
             <a:r>
               <a:rPr lang="en-US" altLang="zh-CN" dirty="0" smtClean="0"/>
@@ -8463,7 +8466,7 @@
             </a:r>
             <a:r>
               <a:rPr lang="en-US" altLang="zh-CN" dirty="0" err="1" smtClean="0"/>
-              <a:t>loop_create_channel</a:t>
+              <a:t>kloop_create_channel</a:t>
             </a:r>
             <a:r>
               <a:rPr lang="en-US" altLang="zh-CN" dirty="0" smtClean="0"/>
@@ -8487,7 +8490,7 @@
             </a:r>
             <a:r>
               <a:rPr lang="en-US" altLang="zh-CN" dirty="0" err="1" smtClean="0"/>
-              <a:t>loop_balancer_t</a:t>
+              <a:t>kloop_balancer_t</a:t>
             </a:r>
             <a:endParaRPr lang="en-US" altLang="zh-CN" dirty="0" smtClean="0"/>
           </a:p>
@@ -8502,7 +8505,7 @@
             </a:r>
             <a:r>
               <a:rPr lang="en-US" altLang="zh-CN" dirty="0" err="1" smtClean="0"/>
-              <a:t>loop_balancer_t</a:t>
+              <a:t>kloop_balancer_t</a:t>
             </a:r>
             <a:r>
               <a:rPr lang="en-US" altLang="zh-CN" dirty="0" smtClean="0"/>
@@ -8510,7 +8513,7 @@
             </a:r>
             <a:r>
               <a:rPr lang="en-US" altLang="zh-CN" dirty="0" err="1" smtClean="0"/>
-              <a:t>loop_t</a:t>
+              <a:t>kloop_t</a:t>
             </a:r>
             <a:endParaRPr lang="en-US" altLang="zh-CN" dirty="0" smtClean="0"/>
           </a:p>
@@ -8525,7 +8528,7 @@
             </a:r>
             <a:r>
               <a:rPr lang="en-US" altLang="zh-CN" dirty="0" err="1" smtClean="0"/>
-              <a:t>loop_t</a:t>
+              <a:t>kloop_t</a:t>
             </a:r>
             <a:endParaRPr lang="en-US" altLang="zh-CN" dirty="0" smtClean="0"/>
           </a:p>
@@ -8540,7 +8543,7 @@
             </a:r>
             <a:r>
               <a:rPr lang="en-US" altLang="zh-CN" dirty="0" err="1" smtClean="0"/>
-              <a:t>loop_balancer_t</a:t>
+              <a:t>kloop_balancer_t</a:t>
             </a:r>
             <a:endParaRPr lang="en-US" altLang="zh-CN" dirty="0" smtClean="0"/>
           </a:p>
@@ -8555,7 +8558,7 @@
             </a:r>
             <a:r>
               <a:rPr lang="en-US" altLang="zh-CN" dirty="0" err="1" smtClean="0"/>
-              <a:t>loop_t</a:t>
+              <a:t>kloop_t</a:t>
             </a:r>
             <a:r>
               <a:rPr lang="en-US" altLang="zh-CN" dirty="0" smtClean="0"/>
@@ -8563,7 +8566,7 @@
             </a:r>
             <a:r>
               <a:rPr lang="en-US" altLang="zh-CN" dirty="0" err="1" smtClean="0"/>
-              <a:t>loop_create_channel</a:t>
+              <a:t>kloop_create_channel</a:t>
             </a:r>
             <a:r>
               <a:rPr lang="en-US" altLang="zh-CN" dirty="0" smtClean="0"/>
@@ -8584,7 +8587,7 @@
             </a:r>
             <a:r>
               <a:rPr lang="en-US" altLang="zh-CN" dirty="0" err="1" smtClean="0"/>
-              <a:t>loop_t</a:t>
+              <a:t>kloop_t</a:t>
             </a:r>
             <a:endParaRPr lang="en-US" altLang="zh-CN" dirty="0" smtClean="0"/>
           </a:p>
@@ -8596,7 +8599,7 @@
             </a:r>
             <a:r>
               <a:rPr lang="en-US" altLang="zh-CN" dirty="0" err="1" smtClean="0"/>
-              <a:t>loop_t</a:t>
+              <a:t>kloop_t</a:t>
             </a:r>
             <a:endParaRPr lang="en-US" altLang="zh-CN" dirty="0" smtClean="0"/>
           </a:p>
@@ -8609,24 +8612,16 @@
           <a:p>
             <a:pPr lvl="1"/>
             <a:r>
-              <a:rPr lang="en-US" altLang="zh-CN" dirty="0" err="1"/>
-              <a:t>c</a:t>
-            </a:r>
-            <a:r>
               <a:rPr lang="en-US" altLang="zh-CN" dirty="0" err="1" smtClean="0"/>
-              <a:t>hannel_ref_share</a:t>
+              <a:t>kchannel_ref_share</a:t>
             </a:r>
             <a:endParaRPr lang="en-US" altLang="zh-CN" dirty="0" smtClean="0"/>
           </a:p>
           <a:p>
             <a:pPr lvl="1"/>
             <a:r>
-              <a:rPr lang="en-US" altLang="zh-CN" dirty="0" err="1"/>
-              <a:t>c</a:t>
-            </a:r>
-            <a:r>
               <a:rPr lang="en-US" altLang="zh-CN" dirty="0" err="1" smtClean="0"/>
-              <a:t>hannel_ref_leave</a:t>
+              <a:t>kchannel_ref_leave</a:t>
             </a:r>
             <a:endParaRPr lang="en-US" altLang="zh-CN" dirty="0" smtClean="0"/>
           </a:p>

</xml_diff>